<commit_message>
Update 07.Efficiency, Environmental Concerns, and Mass Conservation.pptx
</commit_message>
<xml_diff>
--- a/07.Efficiency, Environmental Concerns, and Mass Conservation.pptx
+++ b/07.Efficiency, Environmental Concerns, and Mass Conservation.pptx
@@ -5413,8 +5413,8 @@
         </p:nvSpPr>
         <p:spPr>
           <a:xfrm>
-            <a:off x="5890198" y="4587914"/>
-            <a:ext cx="1326004" cy="369332"/>
+            <a:off x="5999203" y="4587914"/>
+            <a:ext cx="1107996" cy="369332"/>
           </a:xfrm>
           <a:prstGeom prst="rect">
             <a:avLst/>
@@ -5440,7 +5440,7 @@
                 </a:solidFill>
                 <a:hlinkClick r:id="rId2"/>
               </a:rPr>
-              <a:t>Example 2</a:t>
+              <a:t>Solution</a:t>
             </a:r>
             <a:endParaRPr lang="en-US" b="1" dirty="0">
               <a:solidFill>
@@ -10993,8 +10993,8 @@
         </p:nvSpPr>
         <p:spPr>
           <a:xfrm>
-            <a:off x="3908998" y="3886200"/>
-            <a:ext cx="1326004" cy="369332"/>
+            <a:off x="4018003" y="3886200"/>
+            <a:ext cx="1107996" cy="369332"/>
           </a:xfrm>
           <a:prstGeom prst="rect">
             <a:avLst/>
@@ -11144,7 +11144,7 @@
                 </a:solidFill>
                 <a:hlinkClick r:id="rId2"/>
               </a:rPr>
-              <a:t>Example 3</a:t>
+              <a:t>Solution</a:t>
             </a:r>
             <a:endParaRPr lang="en-US" b="1" dirty="0">
               <a:solidFill>
@@ -11276,8 +11276,8 @@
         </p:nvSpPr>
         <p:spPr>
           <a:xfrm>
-            <a:off x="5943600" y="4191000"/>
-            <a:ext cx="1326004" cy="369332"/>
+            <a:off x="6052605" y="4191000"/>
+            <a:ext cx="1107996" cy="369332"/>
           </a:xfrm>
           <a:prstGeom prst="rect">
             <a:avLst/>
@@ -11427,7 +11427,7 @@
                 </a:solidFill>
                 <a:hlinkClick r:id="rId2"/>
               </a:rPr>
-              <a:t>Example 4</a:t>
+              <a:t>Solution</a:t>
             </a:r>
             <a:endParaRPr lang="en-US" b="1" dirty="0">
               <a:solidFill>
@@ -12641,8 +12641,8 @@
         </p:nvSpPr>
         <p:spPr>
           <a:xfrm>
-            <a:off x="5890198" y="4343400"/>
-            <a:ext cx="1326004" cy="369332"/>
+            <a:off x="5999203" y="4343400"/>
+            <a:ext cx="1107996" cy="369332"/>
           </a:xfrm>
           <a:prstGeom prst="rect">
             <a:avLst/>
@@ -12792,7 +12792,7 @@
                 </a:solidFill>
                 <a:hlinkClick r:id="rId3"/>
               </a:rPr>
-              <a:t>Example 5</a:t>
+              <a:t>Solution</a:t>
             </a:r>
             <a:endParaRPr lang="en-US" b="1" dirty="0">
               <a:solidFill>
@@ -16114,8 +16114,8 @@
         </p:nvSpPr>
         <p:spPr>
           <a:xfrm>
-            <a:off x="3908998" y="4800600"/>
-            <a:ext cx="1326004" cy="369332"/>
+            <a:off x="4018003" y="4800600"/>
+            <a:ext cx="1107996" cy="369332"/>
           </a:xfrm>
           <a:prstGeom prst="rect">
             <a:avLst/>
@@ -16141,7 +16141,7 @@
                 </a:solidFill>
                 <a:hlinkClick r:id="rId2"/>
               </a:rPr>
-              <a:t>Example 1</a:t>
+              <a:t>Solution</a:t>
             </a:r>
             <a:endParaRPr lang="en-US" b="1" dirty="0">
               <a:solidFill>

</xml_diff>